<commit_message>
GraphSAGE review 제작 중. 3-2
</commit_message>
<xml_diff>
--- a/papers/review/GCN Review.pptx
+++ b/papers/review/GCN Review.pptx
@@ -218,7 +218,7 @@
           <a:p>
             <a:fld id="{B4BAEF34-DDA1-41A6-94BB-1D7567B3088F}" type="datetimeFigureOut">
               <a:rPr lang="ko-KR" altLang="en-US" smtClean="0"/>
-              <a:t>2023-01-18</a:t>
+              <a:t>2023-01-22</a:t>
             </a:fld>
             <a:endParaRPr lang="ko-KR" altLang="en-US"/>
           </a:p>
@@ -6741,8 +6741,8 @@
           </a:p>
         </p:txBody>
       </p:sp>
-      <mc:AlternateContent xmlns:mc="http://schemas.openxmlformats.org/markup-compatibility/2006">
-        <mc:Choice xmlns:a14="http://schemas.microsoft.com/office/drawing/2010/main" Requires="a14">
+      <mc:AlternateContent xmlns:mc="http://schemas.openxmlformats.org/markup-compatibility/2006" xmlns:a14="http://schemas.microsoft.com/office/drawing/2010/main">
+        <mc:Choice Requires="a14">
           <p:graphicFrame>
             <p:nvGraphicFramePr>
               <p:cNvPr id="13" name="표 6">
@@ -7215,7 +7215,7 @@
             </a:graphic>
           </p:graphicFrame>
         </mc:Choice>
-        <mc:Fallback>
+        <mc:Fallback xmlns="">
           <p:graphicFrame>
             <p:nvGraphicFramePr>
               <p:cNvPr id="13" name="표 6">
@@ -8076,8 +8076,8 @@
           </a:graphicData>
         </a:graphic>
       </p:graphicFrame>
-      <mc:AlternateContent xmlns:mc="http://schemas.openxmlformats.org/markup-compatibility/2006">
-        <mc:Choice xmlns:a14="http://schemas.microsoft.com/office/drawing/2010/main" Requires="a14">
+      <mc:AlternateContent xmlns:mc="http://schemas.openxmlformats.org/markup-compatibility/2006" xmlns:a14="http://schemas.microsoft.com/office/drawing/2010/main">
+        <mc:Choice Requires="a14">
           <p:sp>
             <p:nvSpPr>
               <p:cNvPr id="10" name="내용 개체 틀 2">
@@ -8378,7 +8378,7 @@
             </p:txBody>
           </p:sp>
         </mc:Choice>
-        <mc:Fallback>
+        <mc:Fallback xmlns="">
           <p:sp>
             <p:nvSpPr>
               <p:cNvPr id="10" name="내용 개체 틀 2">
@@ -10732,8 +10732,8 @@
           </a:p>
         </p:txBody>
       </p:sp>
-      <mc:AlternateContent xmlns:mc="http://schemas.openxmlformats.org/markup-compatibility/2006">
-        <mc:Choice xmlns:a14="http://schemas.microsoft.com/office/drawing/2010/main" Requires="a14">
+      <mc:AlternateContent xmlns:mc="http://schemas.openxmlformats.org/markup-compatibility/2006" xmlns:a14="http://schemas.microsoft.com/office/drawing/2010/main">
+        <mc:Choice Requires="a14">
           <p:sp>
             <p:nvSpPr>
               <p:cNvPr id="8" name="내용 개체 틀 2">
@@ -11196,7 +11196,7 @@
             </p:txBody>
           </p:sp>
         </mc:Choice>
-        <mc:Fallback>
+        <mc:Fallback xmlns="">
           <p:sp>
             <p:nvSpPr>
               <p:cNvPr id="8" name="내용 개체 틀 2">
@@ -12366,8 +12366,8 @@
           </a:graphicData>
         </a:graphic>
       </p:graphicFrame>
-      <mc:AlternateContent xmlns:mc="http://schemas.openxmlformats.org/markup-compatibility/2006">
-        <mc:Choice xmlns:a14="http://schemas.microsoft.com/office/drawing/2010/main" Requires="a14">
+      <mc:AlternateContent xmlns:mc="http://schemas.openxmlformats.org/markup-compatibility/2006" xmlns:a14="http://schemas.microsoft.com/office/drawing/2010/main">
+        <mc:Choice Requires="a14">
           <p:sp>
             <p:nvSpPr>
               <p:cNvPr id="9" name="내용 개체 틀 2">
@@ -12689,7 +12689,7 @@
             </p:txBody>
           </p:sp>
         </mc:Choice>
-        <mc:Fallback>
+        <mc:Fallback xmlns="">
           <p:sp>
             <p:nvSpPr>
               <p:cNvPr id="9" name="내용 개체 틀 2">
@@ -13309,8 +13309,8 @@
           </a:graphicData>
         </a:graphic>
       </p:graphicFrame>
-      <mc:AlternateContent xmlns:mc="http://schemas.openxmlformats.org/markup-compatibility/2006">
-        <mc:Choice xmlns:a14="http://schemas.microsoft.com/office/drawing/2010/main" Requires="a14">
+      <mc:AlternateContent xmlns:mc="http://schemas.openxmlformats.org/markup-compatibility/2006" xmlns:a14="http://schemas.microsoft.com/office/drawing/2010/main">
+        <mc:Choice Requires="a14">
           <p:sp>
             <p:nvSpPr>
               <p:cNvPr id="12" name="내용 개체 틀 2">
@@ -13570,7 +13570,7 @@
             </p:txBody>
           </p:sp>
         </mc:Choice>
-        <mc:Fallback>
+        <mc:Fallback xmlns="">
           <p:sp>
             <p:nvSpPr>
               <p:cNvPr id="12" name="내용 개체 틀 2">
@@ -13615,8 +13615,8 @@
           </p:sp>
         </mc:Fallback>
       </mc:AlternateContent>
-      <mc:AlternateContent xmlns:mc="http://schemas.openxmlformats.org/markup-compatibility/2006">
-        <mc:Choice xmlns:a14="http://schemas.microsoft.com/office/drawing/2010/main" Requires="a14">
+      <mc:AlternateContent xmlns:mc="http://schemas.openxmlformats.org/markup-compatibility/2006" xmlns:a14="http://schemas.microsoft.com/office/drawing/2010/main">
+        <mc:Choice Requires="a14">
           <p:graphicFrame>
             <p:nvGraphicFramePr>
               <p:cNvPr id="13" name="표 6">
@@ -14019,7 +14019,7 @@
             </a:graphic>
           </p:graphicFrame>
         </mc:Choice>
-        <mc:Fallback>
+        <mc:Fallback xmlns="">
           <p:graphicFrame>
             <p:nvGraphicFramePr>
               <p:cNvPr id="13" name="표 6">
@@ -14633,8 +14633,8 @@
           </a:prstGeom>
         </p:spPr>
       </p:pic>
-      <mc:AlternateContent xmlns:mc="http://schemas.openxmlformats.org/markup-compatibility/2006">
-        <mc:Choice xmlns:a14="http://schemas.microsoft.com/office/drawing/2010/main" Requires="a14">
+      <mc:AlternateContent xmlns:mc="http://schemas.openxmlformats.org/markup-compatibility/2006" xmlns:a14="http://schemas.microsoft.com/office/drawing/2010/main">
+        <mc:Choice Requires="a14">
           <p:graphicFrame>
             <p:nvGraphicFramePr>
               <p:cNvPr id="13" name="표 6">
@@ -15107,7 +15107,7 @@
             </a:graphic>
           </p:graphicFrame>
         </mc:Choice>
-        <mc:Fallback>
+        <mc:Fallback xmlns="">
           <p:graphicFrame>
             <p:nvGraphicFramePr>
               <p:cNvPr id="13" name="표 6">
@@ -15784,8 +15784,8 @@
           </a:graphicData>
         </a:graphic>
       </p:graphicFrame>
-      <mc:AlternateContent xmlns:mc="http://schemas.openxmlformats.org/markup-compatibility/2006">
-        <mc:Choice xmlns:a14="http://schemas.microsoft.com/office/drawing/2010/main" Requires="a14">
+      <mc:AlternateContent xmlns:mc="http://schemas.openxmlformats.org/markup-compatibility/2006" xmlns:a14="http://schemas.microsoft.com/office/drawing/2010/main">
+        <mc:Choice Requires="a14">
           <p:sp>
             <p:nvSpPr>
               <p:cNvPr id="6" name="내용 개체 틀 2">
@@ -16107,7 +16107,7 @@
             </p:txBody>
           </p:sp>
         </mc:Choice>
-        <mc:Fallback>
+        <mc:Fallback xmlns="">
           <p:sp>
             <p:nvSpPr>
               <p:cNvPr id="6" name="내용 개체 틀 2">
@@ -16425,8 +16425,8 @@
           </a:prstGeom>
         </p:spPr>
       </p:pic>
-      <mc:AlternateContent xmlns:mc="http://schemas.openxmlformats.org/markup-compatibility/2006">
-        <mc:Choice xmlns:a14="http://schemas.microsoft.com/office/drawing/2010/main" Requires="a14">
+      <mc:AlternateContent xmlns:mc="http://schemas.openxmlformats.org/markup-compatibility/2006" xmlns:a14="http://schemas.microsoft.com/office/drawing/2010/main">
+        <mc:Choice Requires="a14">
           <p:graphicFrame>
             <p:nvGraphicFramePr>
               <p:cNvPr id="13" name="표 6">
@@ -16899,7 +16899,7 @@
             </a:graphic>
           </p:graphicFrame>
         </mc:Choice>
-        <mc:Fallback>
+        <mc:Fallback xmlns="">
           <p:graphicFrame>
             <p:nvGraphicFramePr>
               <p:cNvPr id="13" name="표 6">

</xml_diff>